<commit_message>
added pdf version of slide show
</commit_message>
<xml_diff>
--- a/presentation folder/In Defence Of Boring.pptx
+++ b/presentation folder/In Defence Of Boring.pptx
@@ -110,6 +110,11 @@
       </a:defRPr>
     </a:lvl9pPr>
   </p:defaultTextStyle>
+  <p:extLst>
+    <p:ext uri="{EFAFB233-063F-42B5-8137-9DF3F51BA10A}">
+      <p15:sldGuideLst xmlns:p15="http://schemas.microsoft.com/office/powerpoint/2012/main"/>
+    </p:ext>
+  </p:extLst>
 </p:presentation>
 </file>
 
@@ -4225,7 +4230,23 @@
           <a:p>
             <a:r>
               <a:rPr lang="en-US" dirty="0" smtClean="0"/>
-              <a:t>Simple designs found in Bacteria are robust that allow them to live everywhere and everywhere. </a:t>
+              <a:t>Simple designs found in Bacteria are robust that allow them to live everywhere </a:t>
+            </a:r>
+            <a:r>
+              <a:rPr lang="en-US" smtClean="0"/>
+              <a:t>and </a:t>
+            </a:r>
+            <a:r>
+              <a:rPr lang="en-US" smtClean="0"/>
+              <a:t>any</a:t>
+            </a:r>
+            <a:r>
+              <a:rPr lang="en-US" smtClean="0"/>
+              <a:t>where</a:t>
+            </a:r>
+            <a:r>
+              <a:rPr lang="en-US" dirty="0" smtClean="0"/>
+              <a:t>. </a:t>
             </a:r>
           </a:p>
           <a:p>
@@ -4272,13 +4293,33 @@
           <a:p>
             <a:r>
               <a:rPr lang="en-US" dirty="0" smtClean="0"/>
-              <a:t>All these parameters were considered when I was designing this resume. A resume simple enough to be able to sell my services to people.</a:t>
+              <a:t>All these parameters were considered when I was designing this resume. A resume simple enough </a:t>
+            </a:r>
+            <a:r>
+              <a:rPr lang="en-US" dirty="0" smtClean="0"/>
+              <a:t>for me to sell my</a:t>
+            </a:r>
+            <a:r>
+              <a:rPr lang="en-US" dirty="0" smtClean="0"/>
+              <a:t> </a:t>
+            </a:r>
+            <a:r>
+              <a:rPr lang="en-US" dirty="0" smtClean="0"/>
+              <a:t>services to people.</a:t>
             </a:r>
           </a:p>
           <a:p>
             <a:r>
               <a:rPr lang="en-US" i="0" dirty="0" smtClean="0"/>
-              <a:t>I am assured that my resume can be seen in thick jungles of Amazon, the deepest point of Marianna Trench, and the highest point of Mount Everest.</a:t>
+              <a:t>I am assured that my resume can be seen in thick jungles of Amazon, the deepest point of </a:t>
+            </a:r>
+            <a:r>
+              <a:rPr lang="en-US" i="0" dirty="0" smtClean="0"/>
+              <a:t>Mariana </a:t>
+            </a:r>
+            <a:r>
+              <a:rPr lang="en-US" i="0" dirty="0" smtClean="0"/>
+              <a:t>Trench, and the highest point of Mount Everest.</a:t>
             </a:r>
           </a:p>
           <a:p>
@@ -4506,7 +4547,15 @@
           <a:p>
             <a:r>
               <a:rPr lang="en-US" dirty="0" smtClean="0"/>
-              <a:t>For immediate improvement, I am itching to do is the profanity filter, I believe if I am able to complete the code for it will be a momentous step for me in JavaScript.</a:t>
+              <a:t>For immediate improvement, I am itching to </a:t>
+            </a:r>
+            <a:r>
+              <a:rPr lang="en-US" dirty="0" smtClean="0"/>
+              <a:t>do </a:t>
+            </a:r>
+            <a:r>
+              <a:rPr lang="en-US" dirty="0" smtClean="0"/>
+              <a:t>the profanity filter, I believe if I am able to complete the code for it will be a momentous step for me in JavaScript.</a:t>
             </a:r>
           </a:p>
           <a:p>
@@ -4540,7 +4589,11 @@
             <a:pPr lvl="1"/>
             <a:r>
               <a:rPr lang="en-US" dirty="0" smtClean="0"/>
-              <a:t>Make a slideshow of my photos (but the rubric said no absolute values. A lot of website out there uses absolute values, there’s none I found that only purely use flexbox) </a:t>
+              <a:t>Make a slideshow of my photos (but the rubric said no absolute values. A lot of website out there uses absolute values, there’s none I found that only purely use flexbox</a:t>
+            </a:r>
+            <a:r>
+              <a:rPr lang="en-US" dirty="0" smtClean="0"/>
+              <a:t>).</a:t>
             </a:r>
             <a:endParaRPr lang="en-US" dirty="0"/>
           </a:p>

</xml_diff>